<commit_message>
presentation & api server
</commit_message>
<xml_diff>
--- a/ProjectPresentation.pptx
+++ b/ProjectPresentation.pptx
@@ -7,8 +7,20 @@
   <p:sldIdLst>
     <p:sldId id="256" r:id="rId2"/>
     <p:sldId id="257" r:id="rId3"/>
-    <p:sldId id="258" r:id="rId4"/>
-    <p:sldId id="259" r:id="rId5"/>
+    <p:sldId id="271" r:id="rId4"/>
+    <p:sldId id="268" r:id="rId5"/>
+    <p:sldId id="269" r:id="rId6"/>
+    <p:sldId id="258" r:id="rId7"/>
+    <p:sldId id="259" r:id="rId8"/>
+    <p:sldId id="260" r:id="rId9"/>
+    <p:sldId id="261" r:id="rId10"/>
+    <p:sldId id="262" r:id="rId11"/>
+    <p:sldId id="267" r:id="rId12"/>
+    <p:sldId id="270" r:id="rId13"/>
+    <p:sldId id="263" r:id="rId14"/>
+    <p:sldId id="264" r:id="rId15"/>
+    <p:sldId id="265" r:id="rId16"/>
+    <p:sldId id="266" r:id="rId17"/>
   </p:sldIdLst>
   <p:sldSz cx="12192000" cy="6858000"/>
   <p:notesSz cx="6858000" cy="9144000"/>
@@ -107,6 +119,11 @@
       </a:defRPr>
     </a:lvl9pPr>
   </p:defaultTextStyle>
+  <p:extLst>
+    <p:ext uri="{EFAFB233-063F-42B5-8137-9DF3F51BA10A}">
+      <p15:sldGuideLst xmlns:p15="http://schemas.microsoft.com/office/powerpoint/2012/main"/>
+    </p:ext>
+  </p:extLst>
 </p:presentation>
 </file>
 
@@ -257,7 +274,7 @@
           <a:p>
             <a:fld id="{0DAF61AA-5A98-4049-A93E-477E5505141A}" type="datetimeFigureOut">
               <a:rPr lang="en-US" smtClean="0"/>
-              <a:t>10/15/20</a:t>
+              <a:t>10/16/20</a:t>
             </a:fld>
             <a:endParaRPr lang="en-US" dirty="0"/>
           </a:p>
@@ -455,7 +472,7 @@
           <a:p>
             <a:fld id="{0DAF61AA-5A98-4049-A93E-477E5505141A}" type="datetimeFigureOut">
               <a:rPr lang="en-US" smtClean="0"/>
-              <a:t>10/15/20</a:t>
+              <a:t>10/16/20</a:t>
             </a:fld>
             <a:endParaRPr lang="en-US"/>
           </a:p>
@@ -663,7 +680,7 @@
           <a:p>
             <a:fld id="{0DAF61AA-5A98-4049-A93E-477E5505141A}" type="datetimeFigureOut">
               <a:rPr lang="en-US" smtClean="0"/>
-              <a:t>10/15/20</a:t>
+              <a:t>10/16/20</a:t>
             </a:fld>
             <a:endParaRPr lang="en-US"/>
           </a:p>
@@ -861,7 +878,7 @@
           <a:p>
             <a:fld id="{0DAF61AA-5A98-4049-A93E-477E5505141A}" type="datetimeFigureOut">
               <a:rPr lang="en-US" smtClean="0"/>
-              <a:t>10/15/20</a:t>
+              <a:t>10/16/20</a:t>
             </a:fld>
             <a:endParaRPr lang="en-US"/>
           </a:p>
@@ -1136,7 +1153,7 @@
           <a:p>
             <a:fld id="{0DAF61AA-5A98-4049-A93E-477E5505141A}" type="datetimeFigureOut">
               <a:rPr lang="en-US" smtClean="0"/>
-              <a:t>10/15/20</a:t>
+              <a:t>10/16/20</a:t>
             </a:fld>
             <a:endParaRPr lang="en-US"/>
           </a:p>
@@ -1401,7 +1418,7 @@
           <a:p>
             <a:fld id="{0DAF61AA-5A98-4049-A93E-477E5505141A}" type="datetimeFigureOut">
               <a:rPr lang="en-US" smtClean="0"/>
-              <a:t>10/15/20</a:t>
+              <a:t>10/16/20</a:t>
             </a:fld>
             <a:endParaRPr lang="en-US"/>
           </a:p>
@@ -1813,7 +1830,7 @@
           <a:p>
             <a:fld id="{0DAF61AA-5A98-4049-A93E-477E5505141A}" type="datetimeFigureOut">
               <a:rPr lang="en-US" smtClean="0"/>
-              <a:t>10/15/20</a:t>
+              <a:t>10/16/20</a:t>
             </a:fld>
             <a:endParaRPr lang="en-US"/>
           </a:p>
@@ -1954,7 +1971,7 @@
           <a:p>
             <a:fld id="{0DAF61AA-5A98-4049-A93E-477E5505141A}" type="datetimeFigureOut">
               <a:rPr lang="en-US" smtClean="0"/>
-              <a:t>10/15/20</a:t>
+              <a:t>10/16/20</a:t>
             </a:fld>
             <a:endParaRPr lang="en-US"/>
           </a:p>
@@ -2067,7 +2084,7 @@
           <a:p>
             <a:fld id="{0DAF61AA-5A98-4049-A93E-477E5505141A}" type="datetimeFigureOut">
               <a:rPr lang="en-US" smtClean="0"/>
-              <a:t>10/15/20</a:t>
+              <a:t>10/16/20</a:t>
             </a:fld>
             <a:endParaRPr lang="en-US"/>
           </a:p>
@@ -2378,7 +2395,7 @@
           <a:p>
             <a:fld id="{0DAF61AA-5A98-4049-A93E-477E5505141A}" type="datetimeFigureOut">
               <a:rPr lang="en-US" smtClean="0"/>
-              <a:t>10/15/20</a:t>
+              <a:t>10/16/20</a:t>
             </a:fld>
             <a:endParaRPr lang="en-US"/>
           </a:p>
@@ -2669,7 +2686,7 @@
           <a:p>
             <a:fld id="{0DAF61AA-5A98-4049-A93E-477E5505141A}" type="datetimeFigureOut">
               <a:rPr lang="en-US" smtClean="0"/>
-              <a:t>10/15/20</a:t>
+              <a:t>10/16/20</a:t>
             </a:fld>
             <a:endParaRPr lang="en-US"/>
           </a:p>
@@ -6357,7 +6374,7 @@
             <a:fld id="{0DAF61AA-5A98-4049-A93E-477E5505141A}" type="datetimeFigureOut">
               <a:rPr lang="en-US" smtClean="0"/>
               <a:pPr/>
-              <a:t>10/15/20</a:t>
+              <a:t>10/16/20</a:t>
             </a:fld>
             <a:endParaRPr lang="en-US" dirty="0"/>
           </a:p>
@@ -13725,7 +13742,7 @@
           <a:lstStyle/>
           <a:p>
             <a:pPr algn="l"/>
-            <a:endParaRPr lang="en-US" sz="2200">
+            <a:endParaRPr lang="en-US" sz="2200" dirty="0">
               <a:solidFill>
                 <a:srgbClr val="FFFFFF"/>
               </a:solidFill>
@@ -13882,6 +13899,699 @@
 </p:sld>
 </file>
 
+<file path=ppt/slides/slide10.xml><?xml version="1.0" encoding="utf-8"?>
+<p:sld xmlns:a="http://schemas.openxmlformats.org/drawingml/2006/main" xmlns:r="http://schemas.openxmlformats.org/officeDocument/2006/relationships" xmlns:p="http://schemas.openxmlformats.org/presentationml/2006/main">
+  <p:cSld>
+    <p:spTree>
+      <p:nvGrpSpPr>
+        <p:cNvPr id="1" name=""/>
+        <p:cNvGrpSpPr/>
+        <p:nvPr/>
+      </p:nvGrpSpPr>
+      <p:grpSpPr>
+        <a:xfrm>
+          <a:off x="0" y="0"/>
+          <a:ext cx="0" cy="0"/>
+          <a:chOff x="0" y="0"/>
+          <a:chExt cx="0" cy="0"/>
+        </a:xfrm>
+      </p:grpSpPr>
+      <p:sp>
+        <p:nvSpPr>
+          <p:cNvPr id="2" name="Title 1">
+            <a:extLst>
+              <a:ext uri="{FF2B5EF4-FFF2-40B4-BE49-F238E27FC236}">
+                <a16:creationId xmlns:a16="http://schemas.microsoft.com/office/drawing/2014/main" id="{70B9BCD8-89D5-B242-872C-313DCD7E7E85}"/>
+              </a:ext>
+            </a:extLst>
+          </p:cNvPr>
+          <p:cNvSpPr>
+            <a:spLocks noGrp="1"/>
+          </p:cNvSpPr>
+          <p:nvPr>
+            <p:ph type="title"/>
+          </p:nvPr>
+        </p:nvSpPr>
+        <p:spPr/>
+        <p:txBody>
+          <a:bodyPr>
+            <a:normAutofit fontScale="90000"/>
+          </a:bodyPr>
+          <a:lstStyle/>
+          <a:p>
+            <a:r>
+              <a:rPr lang="en-US" dirty="0"/>
+              <a:t>User Authentication</a:t>
+            </a:r>
+            <a:br>
+              <a:rPr lang="en-US" dirty="0"/>
+            </a:br>
+            <a:r>
+              <a:rPr lang="en-US" dirty="0"/>
+              <a:t>GOOGLE SERVERS</a:t>
+            </a:r>
+          </a:p>
+        </p:txBody>
+      </p:sp>
+      <p:sp>
+        <p:nvSpPr>
+          <p:cNvPr id="3" name="Content Placeholder 2">
+            <a:extLst>
+              <a:ext uri="{FF2B5EF4-FFF2-40B4-BE49-F238E27FC236}">
+                <a16:creationId xmlns:a16="http://schemas.microsoft.com/office/drawing/2014/main" id="{74F8ED89-B3CC-3849-ADEA-D7DBE917DDDD}"/>
+              </a:ext>
+            </a:extLst>
+          </p:cNvPr>
+          <p:cNvSpPr>
+            <a:spLocks noGrp="1"/>
+          </p:cNvSpPr>
+          <p:nvPr>
+            <p:ph idx="1"/>
+          </p:nvPr>
+        </p:nvSpPr>
+        <p:spPr/>
+        <p:txBody>
+          <a:bodyPr/>
+          <a:lstStyle/>
+          <a:p>
+            <a:r>
+              <a:rPr lang="en-US" dirty="0"/>
+              <a:t>Google’s JS library makes authentication request to Google</a:t>
+            </a:r>
+          </a:p>
+          <a:p>
+            <a:r>
+              <a:rPr lang="en-US" dirty="0"/>
+              <a:t>Google Displays confirmation screen to user in a popup window</a:t>
+            </a:r>
+          </a:p>
+          <a:p>
+            <a:r>
+              <a:rPr lang="en-US" dirty="0"/>
+              <a:t>User Accepts &amp; popup window closes</a:t>
+            </a:r>
+          </a:p>
+          <a:p>
+            <a:pPr marL="0" indent="0">
+              <a:buNone/>
+            </a:pPr>
+            <a:r>
+              <a:rPr lang="en-US" dirty="0"/>
+              <a:t>Jump to point 3 in USER’S BROWSER</a:t>
+            </a:r>
+          </a:p>
+        </p:txBody>
+      </p:sp>
+    </p:spTree>
+    <p:extLst>
+      <p:ext uri="{BB962C8B-B14F-4D97-AF65-F5344CB8AC3E}">
+        <p14:creationId xmlns:p14="http://schemas.microsoft.com/office/powerpoint/2010/main" val="2486487943"/>
+      </p:ext>
+    </p:extLst>
+  </p:cSld>
+  <p:clrMapOvr>
+    <a:masterClrMapping/>
+  </p:clrMapOvr>
+</p:sld>
+</file>
+
+<file path=ppt/slides/slide11.xml><?xml version="1.0" encoding="utf-8"?>
+<p:sld xmlns:a="http://schemas.openxmlformats.org/drawingml/2006/main" xmlns:r="http://schemas.openxmlformats.org/officeDocument/2006/relationships" xmlns:p="http://schemas.openxmlformats.org/presentationml/2006/main">
+  <p:cSld>
+    <p:spTree>
+      <p:nvGrpSpPr>
+        <p:cNvPr id="1" name=""/>
+        <p:cNvGrpSpPr/>
+        <p:nvPr/>
+      </p:nvGrpSpPr>
+      <p:grpSpPr>
+        <a:xfrm>
+          <a:off x="0" y="0"/>
+          <a:ext cx="0" cy="0"/>
+          <a:chOff x="0" y="0"/>
+          <a:chExt cx="0" cy="0"/>
+        </a:xfrm>
+      </p:grpSpPr>
+      <p:sp>
+        <p:nvSpPr>
+          <p:cNvPr id="2" name="Title 1">
+            <a:extLst>
+              <a:ext uri="{FF2B5EF4-FFF2-40B4-BE49-F238E27FC236}">
+                <a16:creationId xmlns:a16="http://schemas.microsoft.com/office/drawing/2014/main" id="{78BB77E4-7597-A840-BA58-AA45728F5674}"/>
+              </a:ext>
+            </a:extLst>
+          </p:cNvPr>
+          <p:cNvSpPr>
+            <a:spLocks noGrp="1"/>
+          </p:cNvSpPr>
+          <p:nvPr>
+            <p:ph type="title"/>
+          </p:nvPr>
+        </p:nvSpPr>
+        <p:spPr/>
+        <p:txBody>
+          <a:bodyPr/>
+          <a:lstStyle/>
+          <a:p>
+            <a:r>
+              <a:rPr lang="en-US" dirty="0"/>
+              <a:t>Authentication</a:t>
+            </a:r>
+          </a:p>
+        </p:txBody>
+      </p:sp>
+      <p:pic>
+        <p:nvPicPr>
+          <p:cNvPr id="4" name="Content Placeholder 4" descr="Diagram&#10;&#10;Description automatically generated">
+            <a:extLst>
+              <a:ext uri="{FF2B5EF4-FFF2-40B4-BE49-F238E27FC236}">
+                <a16:creationId xmlns:a16="http://schemas.microsoft.com/office/drawing/2014/main" id="{A35371CA-AB46-884B-A75F-E7AA94F5A473}"/>
+              </a:ext>
+            </a:extLst>
+          </p:cNvPr>
+          <p:cNvPicPr>
+            <a:picLocks noGrp="1" noChangeAspect="1"/>
+          </p:cNvPicPr>
+          <p:nvPr>
+            <p:ph idx="1"/>
+          </p:nvPr>
+        </p:nvPicPr>
+        <p:blipFill>
+          <a:blip r:embed="rId2"/>
+          <a:stretch>
+            <a:fillRect/>
+          </a:stretch>
+        </p:blipFill>
+        <p:spPr>
+          <a:xfrm>
+            <a:off x="3048387" y="1825625"/>
+            <a:ext cx="6095226" cy="4351338"/>
+          </a:xfrm>
+        </p:spPr>
+      </p:pic>
+    </p:spTree>
+    <p:extLst>
+      <p:ext uri="{BB962C8B-B14F-4D97-AF65-F5344CB8AC3E}">
+        <p14:creationId xmlns:p14="http://schemas.microsoft.com/office/powerpoint/2010/main" val="43562291"/>
+      </p:ext>
+    </p:extLst>
+  </p:cSld>
+  <p:clrMapOvr>
+    <a:masterClrMapping/>
+  </p:clrMapOvr>
+</p:sld>
+</file>
+
+<file path=ppt/slides/slide12.xml><?xml version="1.0" encoding="utf-8"?>
+<p:sld xmlns:a="http://schemas.openxmlformats.org/drawingml/2006/main" xmlns:r="http://schemas.openxmlformats.org/officeDocument/2006/relationships" xmlns:p="http://schemas.openxmlformats.org/presentationml/2006/main">
+  <p:cSld>
+    <p:spTree>
+      <p:nvGrpSpPr>
+        <p:cNvPr id="1" name=""/>
+        <p:cNvGrpSpPr/>
+        <p:nvPr/>
+      </p:nvGrpSpPr>
+      <p:grpSpPr>
+        <a:xfrm>
+          <a:off x="0" y="0"/>
+          <a:ext cx="0" cy="0"/>
+          <a:chOff x="0" y="0"/>
+          <a:chExt cx="0" cy="0"/>
+        </a:xfrm>
+      </p:grpSpPr>
+      <p:sp>
+        <p:nvSpPr>
+          <p:cNvPr id="2" name="Title 1">
+            <a:extLst>
+              <a:ext uri="{FF2B5EF4-FFF2-40B4-BE49-F238E27FC236}">
+                <a16:creationId xmlns:a16="http://schemas.microsoft.com/office/drawing/2014/main" id="{4CC6FABE-C199-414C-BA7A-8F7B955E0544}"/>
+              </a:ext>
+            </a:extLst>
+          </p:cNvPr>
+          <p:cNvSpPr>
+            <a:spLocks noGrp="1"/>
+          </p:cNvSpPr>
+          <p:nvPr>
+            <p:ph type="title"/>
+          </p:nvPr>
+        </p:nvSpPr>
+        <p:spPr/>
+        <p:txBody>
+          <a:bodyPr/>
+          <a:lstStyle/>
+          <a:p>
+            <a:endParaRPr lang="en-US"/>
+          </a:p>
+        </p:txBody>
+      </p:sp>
+      <p:pic>
+        <p:nvPicPr>
+          <p:cNvPr id="5" name="Content Placeholder 4" descr="Diagram&#10;&#10;Description automatically generated">
+            <a:extLst>
+              <a:ext uri="{FF2B5EF4-FFF2-40B4-BE49-F238E27FC236}">
+                <a16:creationId xmlns:a16="http://schemas.microsoft.com/office/drawing/2014/main" id="{7128A0DF-AE63-0F46-AB7F-2458138A3AB3}"/>
+              </a:ext>
+            </a:extLst>
+          </p:cNvPr>
+          <p:cNvPicPr>
+            <a:picLocks noGrp="1" noChangeAspect="1"/>
+          </p:cNvPicPr>
+          <p:nvPr>
+            <p:ph idx="1"/>
+          </p:nvPr>
+        </p:nvPicPr>
+        <p:blipFill>
+          <a:blip r:embed="rId2"/>
+          <a:stretch>
+            <a:fillRect/>
+          </a:stretch>
+        </p:blipFill>
+        <p:spPr>
+          <a:xfrm>
+            <a:off x="2521687" y="1825625"/>
+            <a:ext cx="7148626" cy="4351338"/>
+          </a:xfrm>
+        </p:spPr>
+      </p:pic>
+    </p:spTree>
+    <p:extLst>
+      <p:ext uri="{BB962C8B-B14F-4D97-AF65-F5344CB8AC3E}">
+        <p14:creationId xmlns:p14="http://schemas.microsoft.com/office/powerpoint/2010/main" val="2622104100"/>
+      </p:ext>
+    </p:extLst>
+  </p:cSld>
+  <p:clrMapOvr>
+    <a:masterClrMapping/>
+  </p:clrMapOvr>
+</p:sld>
+</file>
+
+<file path=ppt/slides/slide13.xml><?xml version="1.0" encoding="utf-8"?>
+<p:sld xmlns:a="http://schemas.openxmlformats.org/drawingml/2006/main" xmlns:r="http://schemas.openxmlformats.org/officeDocument/2006/relationships" xmlns:p="http://schemas.openxmlformats.org/presentationml/2006/main">
+  <p:cSld>
+    <p:spTree>
+      <p:nvGrpSpPr>
+        <p:cNvPr id="1" name=""/>
+        <p:cNvGrpSpPr/>
+        <p:nvPr/>
+      </p:nvGrpSpPr>
+      <p:grpSpPr>
+        <a:xfrm>
+          <a:off x="0" y="0"/>
+          <a:ext cx="0" cy="0"/>
+          <a:chOff x="0" y="0"/>
+          <a:chExt cx="0" cy="0"/>
+        </a:xfrm>
+      </p:grpSpPr>
+      <p:sp>
+        <p:nvSpPr>
+          <p:cNvPr id="2" name="Title 1">
+            <a:extLst>
+              <a:ext uri="{FF2B5EF4-FFF2-40B4-BE49-F238E27FC236}">
+                <a16:creationId xmlns:a16="http://schemas.microsoft.com/office/drawing/2014/main" id="{49C9F09E-49B0-524E-BF7F-741DA3B53684}"/>
+              </a:ext>
+            </a:extLst>
+          </p:cNvPr>
+          <p:cNvSpPr>
+            <a:spLocks noGrp="1"/>
+          </p:cNvSpPr>
+          <p:nvPr>
+            <p:ph type="title"/>
+          </p:nvPr>
+        </p:nvSpPr>
+        <p:spPr/>
+        <p:txBody>
+          <a:bodyPr/>
+          <a:lstStyle/>
+          <a:p>
+            <a:r>
+              <a:rPr lang="en-US" dirty="0"/>
+              <a:t>A little about </a:t>
+            </a:r>
+            <a:r>
+              <a:rPr lang="en-US" dirty="0" err="1"/>
+              <a:t>gapi</a:t>
+            </a:r>
+            <a:endParaRPr lang="en-US" dirty="0"/>
+          </a:p>
+        </p:txBody>
+      </p:sp>
+      <p:sp>
+        <p:nvSpPr>
+          <p:cNvPr id="3" name="Content Placeholder 2">
+            <a:extLst>
+              <a:ext uri="{FF2B5EF4-FFF2-40B4-BE49-F238E27FC236}">
+                <a16:creationId xmlns:a16="http://schemas.microsoft.com/office/drawing/2014/main" id="{8F6C9D22-F216-2D43-96B5-93C3873FE7C4}"/>
+              </a:ext>
+            </a:extLst>
+          </p:cNvPr>
+          <p:cNvSpPr>
+            <a:spLocks noGrp="1"/>
+          </p:cNvSpPr>
+          <p:nvPr>
+            <p:ph idx="1"/>
+          </p:nvPr>
+        </p:nvSpPr>
+        <p:spPr/>
+        <p:txBody>
+          <a:bodyPr/>
+          <a:lstStyle/>
+          <a:p>
+            <a:r>
+              <a:rPr lang="en-US" dirty="0"/>
+              <a:t>The </a:t>
+            </a:r>
+            <a:r>
+              <a:rPr lang="en-US" dirty="0" err="1"/>
+              <a:t>gapi</a:t>
+            </a:r>
+            <a:r>
+              <a:rPr lang="en-US" dirty="0"/>
+              <a:t> library is extensively used all over the internet</a:t>
+            </a:r>
+          </a:p>
+          <a:p>
+            <a:r>
+              <a:rPr lang="en-US" dirty="0"/>
+              <a:t>When you first load up </a:t>
+            </a:r>
+            <a:r>
+              <a:rPr lang="en-US" dirty="0" err="1"/>
+              <a:t>gapi</a:t>
+            </a:r>
+            <a:r>
+              <a:rPr lang="en-US" dirty="0"/>
+              <a:t>, it simply has one method tied to it – the ‘load’ function</a:t>
+            </a:r>
+          </a:p>
+          <a:p>
+            <a:r>
+              <a:rPr lang="en-US" dirty="0"/>
+              <a:t>You then literally have to load up any other functionality you require using this load function. </a:t>
+            </a:r>
+          </a:p>
+          <a:p>
+            <a:r>
+              <a:rPr lang="en-US" dirty="0"/>
+              <a:t>This extra functionality is then added to the </a:t>
+            </a:r>
+            <a:r>
+              <a:rPr lang="en-US" dirty="0" err="1"/>
+              <a:t>gapi</a:t>
+            </a:r>
+            <a:r>
+              <a:rPr lang="en-US" dirty="0"/>
+              <a:t> library</a:t>
+            </a:r>
+          </a:p>
+          <a:p>
+            <a:r>
+              <a:rPr lang="en-US" dirty="0" err="1"/>
+              <a:t>Gapi.load</a:t>
+            </a:r>
+            <a:r>
+              <a:rPr lang="en-US" dirty="0"/>
+              <a:t>(‘client:auth2’)</a:t>
+            </a:r>
+          </a:p>
+        </p:txBody>
+      </p:sp>
+    </p:spTree>
+    <p:extLst>
+      <p:ext uri="{BB962C8B-B14F-4D97-AF65-F5344CB8AC3E}">
+        <p14:creationId xmlns:p14="http://schemas.microsoft.com/office/powerpoint/2010/main" val="819684956"/>
+      </p:ext>
+    </p:extLst>
+  </p:cSld>
+  <p:clrMapOvr>
+    <a:masterClrMapping/>
+  </p:clrMapOvr>
+</p:sld>
+</file>
+
+<file path=ppt/slides/slide14.xml><?xml version="1.0" encoding="utf-8"?>
+<p:sld xmlns:a="http://schemas.openxmlformats.org/drawingml/2006/main" xmlns:r="http://schemas.openxmlformats.org/officeDocument/2006/relationships" xmlns:p="http://schemas.openxmlformats.org/presentationml/2006/main">
+  <p:cSld>
+    <p:spTree>
+      <p:nvGrpSpPr>
+        <p:cNvPr id="1" name=""/>
+        <p:cNvGrpSpPr/>
+        <p:nvPr/>
+      </p:nvGrpSpPr>
+      <p:grpSpPr>
+        <a:xfrm>
+          <a:off x="0" y="0"/>
+          <a:ext cx="0" cy="0"/>
+          <a:chOff x="0" y="0"/>
+          <a:chExt cx="0" cy="0"/>
+        </a:xfrm>
+      </p:grpSpPr>
+      <p:sp>
+        <p:nvSpPr>
+          <p:cNvPr id="2" name="Title 1">
+            <a:extLst>
+              <a:ext uri="{FF2B5EF4-FFF2-40B4-BE49-F238E27FC236}">
+                <a16:creationId xmlns:a16="http://schemas.microsoft.com/office/drawing/2014/main" id="{427BC78F-EA07-8848-A634-9591F2FBB510}"/>
+              </a:ext>
+            </a:extLst>
+          </p:cNvPr>
+          <p:cNvSpPr>
+            <a:spLocks noGrp="1"/>
+          </p:cNvSpPr>
+          <p:nvPr>
+            <p:ph type="title"/>
+          </p:nvPr>
+        </p:nvSpPr>
+        <p:spPr/>
+        <p:txBody>
+          <a:bodyPr/>
+          <a:lstStyle/>
+          <a:p>
+            <a:r>
+              <a:rPr lang="en-US" dirty="0"/>
+              <a:t>Handling inputs without redux</a:t>
+            </a:r>
+          </a:p>
+        </p:txBody>
+      </p:sp>
+      <p:pic>
+        <p:nvPicPr>
+          <p:cNvPr id="5" name="Content Placeholder 4" descr="Diagram&#10;&#10;Description automatically generated">
+            <a:extLst>
+              <a:ext uri="{FF2B5EF4-FFF2-40B4-BE49-F238E27FC236}">
+                <a16:creationId xmlns:a16="http://schemas.microsoft.com/office/drawing/2014/main" id="{EDABE029-4929-F44D-8741-850CFAE59BD2}"/>
+              </a:ext>
+            </a:extLst>
+          </p:cNvPr>
+          <p:cNvPicPr>
+            <a:picLocks noGrp="1" noChangeAspect="1"/>
+          </p:cNvPicPr>
+          <p:nvPr>
+            <p:ph idx="1"/>
+          </p:nvPr>
+        </p:nvPicPr>
+        <p:blipFill>
+          <a:blip r:embed="rId2"/>
+          <a:stretch>
+            <a:fillRect/>
+          </a:stretch>
+        </p:blipFill>
+        <p:spPr>
+          <a:xfrm>
+            <a:off x="2247900" y="2153444"/>
+            <a:ext cx="7696200" cy="3695700"/>
+          </a:xfrm>
+        </p:spPr>
+      </p:pic>
+    </p:spTree>
+    <p:extLst>
+      <p:ext uri="{BB962C8B-B14F-4D97-AF65-F5344CB8AC3E}">
+        <p14:creationId xmlns:p14="http://schemas.microsoft.com/office/powerpoint/2010/main" val="1606440534"/>
+      </p:ext>
+    </p:extLst>
+  </p:cSld>
+  <p:clrMapOvr>
+    <a:masterClrMapping/>
+  </p:clrMapOvr>
+</p:sld>
+</file>
+
+<file path=ppt/slides/slide15.xml><?xml version="1.0" encoding="utf-8"?>
+<p:sld xmlns:a="http://schemas.openxmlformats.org/drawingml/2006/main" xmlns:r="http://schemas.openxmlformats.org/officeDocument/2006/relationships" xmlns:p="http://schemas.openxmlformats.org/presentationml/2006/main">
+  <p:cSld>
+    <p:spTree>
+      <p:nvGrpSpPr>
+        <p:cNvPr id="1" name=""/>
+        <p:cNvGrpSpPr/>
+        <p:nvPr/>
+      </p:nvGrpSpPr>
+      <p:grpSpPr>
+        <a:xfrm>
+          <a:off x="0" y="0"/>
+          <a:ext cx="0" cy="0"/>
+          <a:chOff x="0" y="0"/>
+          <a:chExt cx="0" cy="0"/>
+        </a:xfrm>
+      </p:grpSpPr>
+      <p:sp>
+        <p:nvSpPr>
+          <p:cNvPr id="2" name="Title 1">
+            <a:extLst>
+              <a:ext uri="{FF2B5EF4-FFF2-40B4-BE49-F238E27FC236}">
+                <a16:creationId xmlns:a16="http://schemas.microsoft.com/office/drawing/2014/main" id="{7104F7D2-2E4E-1D44-ABEE-8FAC9F3DE90A}"/>
+              </a:ext>
+            </a:extLst>
+          </p:cNvPr>
+          <p:cNvSpPr>
+            <a:spLocks noGrp="1"/>
+          </p:cNvSpPr>
+          <p:nvPr>
+            <p:ph type="title"/>
+          </p:nvPr>
+        </p:nvSpPr>
+        <p:spPr/>
+        <p:txBody>
+          <a:bodyPr/>
+          <a:lstStyle/>
+          <a:p>
+            <a:r>
+              <a:rPr lang="en-US" dirty="0"/>
+              <a:t>Handling input with redux-form</a:t>
+            </a:r>
+          </a:p>
+        </p:txBody>
+      </p:sp>
+      <p:pic>
+        <p:nvPicPr>
+          <p:cNvPr id="5" name="Content Placeholder 4" descr="Diagram&#10;&#10;Description automatically generated">
+            <a:extLst>
+              <a:ext uri="{FF2B5EF4-FFF2-40B4-BE49-F238E27FC236}">
+                <a16:creationId xmlns:a16="http://schemas.microsoft.com/office/drawing/2014/main" id="{964FE485-2DAC-AC41-A3B5-1D5749DDE0F6}"/>
+              </a:ext>
+            </a:extLst>
+          </p:cNvPr>
+          <p:cNvPicPr>
+            <a:picLocks noGrp="1" noChangeAspect="1"/>
+          </p:cNvPicPr>
+          <p:nvPr>
+            <p:ph idx="1"/>
+          </p:nvPr>
+        </p:nvPicPr>
+        <p:blipFill>
+          <a:blip r:embed="rId2"/>
+          <a:stretch>
+            <a:fillRect/>
+          </a:stretch>
+        </p:blipFill>
+        <p:spPr>
+          <a:xfrm>
+            <a:off x="838200" y="1885947"/>
+            <a:ext cx="10515600" cy="4230694"/>
+          </a:xfrm>
+        </p:spPr>
+      </p:pic>
+    </p:spTree>
+    <p:extLst>
+      <p:ext uri="{BB962C8B-B14F-4D97-AF65-F5344CB8AC3E}">
+        <p14:creationId xmlns:p14="http://schemas.microsoft.com/office/powerpoint/2010/main" val="3894490831"/>
+      </p:ext>
+    </p:extLst>
+  </p:cSld>
+  <p:clrMapOvr>
+    <a:masterClrMapping/>
+  </p:clrMapOvr>
+</p:sld>
+</file>
+
+<file path=ppt/slides/slide16.xml><?xml version="1.0" encoding="utf-8"?>
+<p:sld xmlns:a="http://schemas.openxmlformats.org/drawingml/2006/main" xmlns:r="http://schemas.openxmlformats.org/officeDocument/2006/relationships" xmlns:p="http://schemas.openxmlformats.org/presentationml/2006/main">
+  <p:cSld>
+    <p:spTree>
+      <p:nvGrpSpPr>
+        <p:cNvPr id="1" name=""/>
+        <p:cNvGrpSpPr/>
+        <p:nvPr/>
+      </p:nvGrpSpPr>
+      <p:grpSpPr>
+        <a:xfrm>
+          <a:off x="0" y="0"/>
+          <a:ext cx="0" cy="0"/>
+          <a:chOff x="0" y="0"/>
+          <a:chExt cx="0" cy="0"/>
+        </a:xfrm>
+      </p:grpSpPr>
+      <p:sp>
+        <p:nvSpPr>
+          <p:cNvPr id="2" name="Title 1">
+            <a:extLst>
+              <a:ext uri="{FF2B5EF4-FFF2-40B4-BE49-F238E27FC236}">
+                <a16:creationId xmlns:a16="http://schemas.microsoft.com/office/drawing/2014/main" id="{5AFE0EC9-544B-9F40-B677-C6340F34FAED}"/>
+              </a:ext>
+            </a:extLst>
+          </p:cNvPr>
+          <p:cNvSpPr>
+            <a:spLocks noGrp="1"/>
+          </p:cNvSpPr>
+          <p:nvPr>
+            <p:ph type="title"/>
+          </p:nvPr>
+        </p:nvSpPr>
+        <p:spPr/>
+        <p:txBody>
+          <a:bodyPr>
+            <a:normAutofit fontScale="90000"/>
+          </a:bodyPr>
+          <a:lstStyle/>
+          <a:p>
+            <a:r>
+              <a:rPr lang="en-US" dirty="0"/>
+              <a:t>Using JSON server for these RESTful API</a:t>
+            </a:r>
+          </a:p>
+        </p:txBody>
+      </p:sp>
+      <p:pic>
+        <p:nvPicPr>
+          <p:cNvPr id="9" name="Content Placeholder 8" descr="Diagram&#10;&#10;Description automatically generated">
+            <a:extLst>
+              <a:ext uri="{FF2B5EF4-FFF2-40B4-BE49-F238E27FC236}">
+                <a16:creationId xmlns:a16="http://schemas.microsoft.com/office/drawing/2014/main" id="{657BB6C8-5125-3344-A9BE-0EC13C8014CF}"/>
+              </a:ext>
+            </a:extLst>
+          </p:cNvPr>
+          <p:cNvPicPr>
+            <a:picLocks noGrp="1" noChangeAspect="1"/>
+          </p:cNvPicPr>
+          <p:nvPr>
+            <p:ph idx="1"/>
+          </p:nvPr>
+        </p:nvPicPr>
+        <p:blipFill>
+          <a:blip r:embed="rId2"/>
+          <a:stretch>
+            <a:fillRect/>
+          </a:stretch>
+        </p:blipFill>
+        <p:spPr>
+          <a:xfrm>
+            <a:off x="2781663" y="1825625"/>
+            <a:ext cx="6628673" cy="4351338"/>
+          </a:xfrm>
+        </p:spPr>
+      </p:pic>
+    </p:spTree>
+    <p:extLst>
+      <p:ext uri="{BB962C8B-B14F-4D97-AF65-F5344CB8AC3E}">
+        <p14:creationId xmlns:p14="http://schemas.microsoft.com/office/powerpoint/2010/main" val="158763133"/>
+      </p:ext>
+    </p:extLst>
+  </p:cSld>
+  <p:clrMapOvr>
+    <a:masterClrMapping/>
+  </p:clrMapOvr>
+</p:sld>
+</file>
+
 <file path=ppt/slides/slide2.xml><?xml version="1.0" encoding="utf-8"?>
 <p:sld xmlns:a="http://schemas.openxmlformats.org/drawingml/2006/main" xmlns:r="http://schemas.openxmlformats.org/officeDocument/2006/relationships" xmlns:p="http://schemas.openxmlformats.org/presentationml/2006/main">
   <p:cSld>
@@ -13927,31 +14637,35 @@
           </a:p>
         </p:txBody>
       </p:sp>
-      <p:sp>
-        <p:nvSpPr>
-          <p:cNvPr id="3" name="Content Placeholder 2">
+      <p:pic>
+        <p:nvPicPr>
+          <p:cNvPr id="5" name="Content Placeholder 4" descr="Diagram&#10;&#10;Description automatically generated">
             <a:extLst>
               <a:ext uri="{FF2B5EF4-FFF2-40B4-BE49-F238E27FC236}">
-                <a16:creationId xmlns:a16="http://schemas.microsoft.com/office/drawing/2014/main" id="{3EB0ECD5-3454-A54F-97C9-0FD5816AA19A}"/>
+                <a16:creationId xmlns:a16="http://schemas.microsoft.com/office/drawing/2014/main" id="{B560C8CF-B57E-B24B-ADAF-3EA97B55CF27}"/>
               </a:ext>
             </a:extLst>
           </p:cNvPr>
-          <p:cNvSpPr>
-            <a:spLocks noGrp="1"/>
-          </p:cNvSpPr>
+          <p:cNvPicPr>
+            <a:picLocks noGrp="1" noChangeAspect="1"/>
+          </p:cNvPicPr>
           <p:nvPr>
             <p:ph idx="1"/>
           </p:nvPr>
-        </p:nvSpPr>
-        <p:spPr/>
-        <p:txBody>
-          <a:bodyPr/>
-          <a:lstStyle/>
-          <a:p>
-            <a:endParaRPr lang="en-US"/>
-          </a:p>
-        </p:txBody>
-      </p:sp>
+        </p:nvPicPr>
+        <p:blipFill>
+          <a:blip r:embed="rId2"/>
+          <a:stretch>
+            <a:fillRect/>
+          </a:stretch>
+        </p:blipFill>
+        <p:spPr>
+          <a:xfrm>
+            <a:off x="838200" y="2127757"/>
+            <a:ext cx="10515600" cy="3747074"/>
+          </a:xfrm>
+        </p:spPr>
+      </p:pic>
     </p:spTree>
     <p:extLst>
       <p:ext uri="{BB962C8B-B14F-4D97-AF65-F5344CB8AC3E}">
@@ -13966,6 +14680,267 @@
 </file>
 
 <file path=ppt/slides/slide3.xml><?xml version="1.0" encoding="utf-8"?>
+<p:sld xmlns:a="http://schemas.openxmlformats.org/drawingml/2006/main" xmlns:r="http://schemas.openxmlformats.org/officeDocument/2006/relationships" xmlns:p="http://schemas.openxmlformats.org/presentationml/2006/main">
+  <p:cSld>
+    <p:spTree>
+      <p:nvGrpSpPr>
+        <p:cNvPr id="1" name=""/>
+        <p:cNvGrpSpPr/>
+        <p:nvPr/>
+      </p:nvGrpSpPr>
+      <p:grpSpPr>
+        <a:xfrm>
+          <a:off x="0" y="0"/>
+          <a:ext cx="0" cy="0"/>
+          <a:chOff x="0" y="0"/>
+          <a:chExt cx="0" cy="0"/>
+        </a:xfrm>
+      </p:grpSpPr>
+      <p:sp>
+        <p:nvSpPr>
+          <p:cNvPr id="2" name="Title 1">
+            <a:extLst>
+              <a:ext uri="{FF2B5EF4-FFF2-40B4-BE49-F238E27FC236}">
+                <a16:creationId xmlns:a16="http://schemas.microsoft.com/office/drawing/2014/main" id="{66109466-A9D1-7E44-B840-B2A5EA0B8D8C}"/>
+              </a:ext>
+            </a:extLst>
+          </p:cNvPr>
+          <p:cNvSpPr>
+            <a:spLocks noGrp="1"/>
+          </p:cNvSpPr>
+          <p:nvPr>
+            <p:ph type="title"/>
+          </p:nvPr>
+        </p:nvSpPr>
+        <p:spPr/>
+        <p:txBody>
+          <a:bodyPr/>
+          <a:lstStyle/>
+          <a:p>
+            <a:r>
+              <a:rPr lang="en-US" dirty="0"/>
+              <a:t>App overview</a:t>
+            </a:r>
+          </a:p>
+        </p:txBody>
+      </p:sp>
+      <p:pic>
+        <p:nvPicPr>
+          <p:cNvPr id="5" name="Content Placeholder 4" descr="Diagram&#10;&#10;Description automatically generated">
+            <a:extLst>
+              <a:ext uri="{FF2B5EF4-FFF2-40B4-BE49-F238E27FC236}">
+                <a16:creationId xmlns:a16="http://schemas.microsoft.com/office/drawing/2014/main" id="{E15FAAA0-21F7-9F45-818F-9EB2F0ED402D}"/>
+              </a:ext>
+            </a:extLst>
+          </p:cNvPr>
+          <p:cNvPicPr>
+            <a:picLocks noGrp="1" noChangeAspect="1"/>
+          </p:cNvPicPr>
+          <p:nvPr>
+            <p:ph idx="1"/>
+          </p:nvPr>
+        </p:nvPicPr>
+        <p:blipFill>
+          <a:blip r:embed="rId2"/>
+          <a:stretch>
+            <a:fillRect/>
+          </a:stretch>
+        </p:blipFill>
+        <p:spPr>
+          <a:xfrm>
+            <a:off x="1282700" y="1943894"/>
+            <a:ext cx="9626600" cy="4114800"/>
+          </a:xfrm>
+        </p:spPr>
+      </p:pic>
+    </p:spTree>
+    <p:extLst>
+      <p:ext uri="{BB962C8B-B14F-4D97-AF65-F5344CB8AC3E}">
+        <p14:creationId xmlns:p14="http://schemas.microsoft.com/office/powerpoint/2010/main" val="4274045878"/>
+      </p:ext>
+    </p:extLst>
+  </p:cSld>
+  <p:clrMapOvr>
+    <a:masterClrMapping/>
+  </p:clrMapOvr>
+</p:sld>
+</file>
+
+<file path=ppt/slides/slide4.xml><?xml version="1.0" encoding="utf-8"?>
+<p:sld xmlns:a="http://schemas.openxmlformats.org/drawingml/2006/main" xmlns:r="http://schemas.openxmlformats.org/officeDocument/2006/relationships" xmlns:p="http://schemas.openxmlformats.org/presentationml/2006/main">
+  <p:cSld>
+    <p:spTree>
+      <p:nvGrpSpPr>
+        <p:cNvPr id="1" name=""/>
+        <p:cNvGrpSpPr/>
+        <p:nvPr/>
+      </p:nvGrpSpPr>
+      <p:grpSpPr>
+        <a:xfrm>
+          <a:off x="0" y="0"/>
+          <a:ext cx="0" cy="0"/>
+          <a:chOff x="0" y="0"/>
+          <a:chExt cx="0" cy="0"/>
+        </a:xfrm>
+      </p:grpSpPr>
+      <p:sp>
+        <p:nvSpPr>
+          <p:cNvPr id="2" name="Title 1">
+            <a:extLst>
+              <a:ext uri="{FF2B5EF4-FFF2-40B4-BE49-F238E27FC236}">
+                <a16:creationId xmlns:a16="http://schemas.microsoft.com/office/drawing/2014/main" id="{63C427CF-0A16-2746-95FA-77219C156B61}"/>
+              </a:ext>
+            </a:extLst>
+          </p:cNvPr>
+          <p:cNvSpPr>
+            <a:spLocks noGrp="1"/>
+          </p:cNvSpPr>
+          <p:nvPr>
+            <p:ph type="title"/>
+          </p:nvPr>
+        </p:nvSpPr>
+        <p:spPr/>
+        <p:txBody>
+          <a:bodyPr/>
+          <a:lstStyle/>
+          <a:p>
+            <a:r>
+              <a:rPr lang="en-US" dirty="0"/>
+              <a:t>App Overview</a:t>
+            </a:r>
+          </a:p>
+        </p:txBody>
+      </p:sp>
+      <p:pic>
+        <p:nvPicPr>
+          <p:cNvPr id="5" name="Content Placeholder 4" descr="Diagram&#10;&#10;Description automatically generated">
+            <a:extLst>
+              <a:ext uri="{FF2B5EF4-FFF2-40B4-BE49-F238E27FC236}">
+                <a16:creationId xmlns:a16="http://schemas.microsoft.com/office/drawing/2014/main" id="{4F5C38E3-8639-F24B-BB0C-913CCFE288A4}"/>
+              </a:ext>
+            </a:extLst>
+          </p:cNvPr>
+          <p:cNvPicPr>
+            <a:picLocks noGrp="1" noChangeAspect="1"/>
+          </p:cNvPicPr>
+          <p:nvPr>
+            <p:ph idx="1"/>
+          </p:nvPr>
+        </p:nvPicPr>
+        <p:blipFill>
+          <a:blip r:embed="rId2"/>
+          <a:stretch>
+            <a:fillRect/>
+          </a:stretch>
+        </p:blipFill>
+        <p:spPr>
+          <a:xfrm>
+            <a:off x="1190957" y="1825625"/>
+            <a:ext cx="9810085" cy="4351338"/>
+          </a:xfrm>
+        </p:spPr>
+      </p:pic>
+    </p:spTree>
+    <p:extLst>
+      <p:ext uri="{BB962C8B-B14F-4D97-AF65-F5344CB8AC3E}">
+        <p14:creationId xmlns:p14="http://schemas.microsoft.com/office/powerpoint/2010/main" val="3324836132"/>
+      </p:ext>
+    </p:extLst>
+  </p:cSld>
+  <p:clrMapOvr>
+    <a:masterClrMapping/>
+  </p:clrMapOvr>
+</p:sld>
+</file>
+
+<file path=ppt/slides/slide5.xml><?xml version="1.0" encoding="utf-8"?>
+<p:sld xmlns:a="http://schemas.openxmlformats.org/drawingml/2006/main" xmlns:r="http://schemas.openxmlformats.org/officeDocument/2006/relationships" xmlns:p="http://schemas.openxmlformats.org/presentationml/2006/main">
+  <p:cSld>
+    <p:spTree>
+      <p:nvGrpSpPr>
+        <p:cNvPr id="1" name=""/>
+        <p:cNvGrpSpPr/>
+        <p:nvPr/>
+      </p:nvGrpSpPr>
+      <p:grpSpPr>
+        <a:xfrm>
+          <a:off x="0" y="0"/>
+          <a:ext cx="0" cy="0"/>
+          <a:chOff x="0" y="0"/>
+          <a:chExt cx="0" cy="0"/>
+        </a:xfrm>
+      </p:grpSpPr>
+      <p:sp>
+        <p:nvSpPr>
+          <p:cNvPr id="2" name="Title 1">
+            <a:extLst>
+              <a:ext uri="{FF2B5EF4-FFF2-40B4-BE49-F238E27FC236}">
+                <a16:creationId xmlns:a16="http://schemas.microsoft.com/office/drawing/2014/main" id="{B0C5F324-42E3-2443-A4EE-7E68A44359A5}"/>
+              </a:ext>
+            </a:extLst>
+          </p:cNvPr>
+          <p:cNvSpPr>
+            <a:spLocks noGrp="1"/>
+          </p:cNvSpPr>
+          <p:nvPr>
+            <p:ph type="title"/>
+          </p:nvPr>
+        </p:nvSpPr>
+        <p:spPr/>
+        <p:txBody>
+          <a:bodyPr/>
+          <a:lstStyle/>
+          <a:p>
+            <a:r>
+              <a:rPr lang="en-US" dirty="0"/>
+              <a:t>App Mockup</a:t>
+            </a:r>
+          </a:p>
+        </p:txBody>
+      </p:sp>
+      <p:pic>
+        <p:nvPicPr>
+          <p:cNvPr id="5" name="Content Placeholder 4" descr="Graphical user interface&#10;&#10;Description automatically generated">
+            <a:extLst>
+              <a:ext uri="{FF2B5EF4-FFF2-40B4-BE49-F238E27FC236}">
+                <a16:creationId xmlns:a16="http://schemas.microsoft.com/office/drawing/2014/main" id="{6BFE0D28-5F32-7E48-8ADC-CA96009CE8B2}"/>
+              </a:ext>
+            </a:extLst>
+          </p:cNvPr>
+          <p:cNvPicPr>
+            <a:picLocks noGrp="1" noChangeAspect="1"/>
+          </p:cNvPicPr>
+          <p:nvPr>
+            <p:ph idx="1"/>
+          </p:nvPr>
+        </p:nvPicPr>
+        <p:blipFill>
+          <a:blip r:embed="rId2"/>
+          <a:stretch>
+            <a:fillRect/>
+          </a:stretch>
+        </p:blipFill>
+        <p:spPr>
+          <a:xfrm>
+            <a:off x="2007166" y="1825625"/>
+            <a:ext cx="8177667" cy="4351338"/>
+          </a:xfrm>
+        </p:spPr>
+      </p:pic>
+    </p:spTree>
+    <p:extLst>
+      <p:ext uri="{BB962C8B-B14F-4D97-AF65-F5344CB8AC3E}">
+        <p14:creationId xmlns:p14="http://schemas.microsoft.com/office/powerpoint/2010/main" val="2753925961"/>
+      </p:ext>
+    </p:extLst>
+  </p:cSld>
+  <p:clrMapOvr>
+    <a:masterClrMapping/>
+  </p:clrMapOvr>
+</p:sld>
+</file>
+
+<file path=ppt/slides/slide6.xml><?xml version="1.0" encoding="utf-8"?>
 <p:sld xmlns:a="http://schemas.openxmlformats.org/drawingml/2006/main" xmlns:r="http://schemas.openxmlformats.org/officeDocument/2006/relationships" xmlns:p="http://schemas.openxmlformats.org/presentationml/2006/main">
   <p:cSld>
     <p:spTree>
@@ -14069,7 +15044,7 @@
 </p:sld>
 </file>
 
-<file path=ppt/slides/slide4.xml><?xml version="1.0" encoding="utf-8"?>
+<file path=ppt/slides/slide7.xml><?xml version="1.0" encoding="utf-8"?>
 <p:sld xmlns:a="http://schemas.openxmlformats.org/drawingml/2006/main" xmlns:r="http://schemas.openxmlformats.org/officeDocument/2006/relationships" xmlns:p="http://schemas.openxmlformats.org/presentationml/2006/main">
   <p:cSld>
     <p:spTree>
@@ -14107,7 +15082,10 @@
           <a:bodyPr/>
           <a:lstStyle/>
           <a:p>
-            <a:endParaRPr lang="en-US"/>
+            <a:r>
+              <a:rPr lang="en-US" dirty="0"/>
+              <a:t>Navigation - &lt;a&gt; tags</a:t>
+            </a:r>
           </a:p>
         </p:txBody>
       </p:sp>
@@ -14129,10 +15107,77 @@
         </p:nvSpPr>
         <p:spPr/>
         <p:txBody>
-          <a:bodyPr/>
+          <a:bodyPr>
+            <a:normAutofit fontScale="92500" lnSpcReduction="10000"/>
+          </a:bodyPr>
           <a:lstStyle/>
           <a:p>
-            <a:endParaRPr lang="en-US"/>
+            <a:r>
+              <a:rPr lang="en-US" dirty="0"/>
+              <a:t>Can’t use conventional HTML anchor tags in a React app</a:t>
+            </a:r>
+          </a:p>
+          <a:p>
+            <a:r>
+              <a:rPr lang="en-US" dirty="0"/>
+              <a:t>Browser would make a request to the server (localhost:3000)</a:t>
+            </a:r>
+          </a:p>
+          <a:p>
+            <a:r>
+              <a:rPr lang="en-US" dirty="0"/>
+              <a:t>The development server responds with an </a:t>
+            </a:r>
+            <a:r>
+              <a:rPr lang="en-US" dirty="0" err="1"/>
+              <a:t>index.html</a:t>
+            </a:r>
+            <a:r>
+              <a:rPr lang="en-US" dirty="0"/>
+              <a:t> file</a:t>
+            </a:r>
+          </a:p>
+          <a:p>
+            <a:r>
+              <a:rPr lang="en-US" dirty="0"/>
+              <a:t>Browser receives the </a:t>
+            </a:r>
+            <a:r>
+              <a:rPr lang="en-US" dirty="0" err="1"/>
+              <a:t>index.html</a:t>
+            </a:r>
+            <a:r>
+              <a:rPr lang="en-US" dirty="0"/>
+              <a:t> file, dumps the old </a:t>
+            </a:r>
+            <a:r>
+              <a:rPr lang="en-US" dirty="0" err="1"/>
+              <a:t>index.html</a:t>
+            </a:r>
+            <a:r>
+              <a:rPr lang="en-US" dirty="0"/>
+              <a:t> file it was showing (including all of the React/Redux State data!; </a:t>
+            </a:r>
+            <a:r>
+              <a:rPr lang="en-US" dirty="0" err="1"/>
+              <a:t>javascript</a:t>
+            </a:r>
+            <a:r>
+              <a:rPr lang="en-US" dirty="0"/>
+              <a:t> variables/data)</a:t>
+            </a:r>
+          </a:p>
+          <a:p>
+            <a:r>
+              <a:rPr lang="en-US" dirty="0"/>
+              <a:t>App starts up for the second time without any data previously entered by a user</a:t>
+            </a:r>
+          </a:p>
+          <a:p>
+            <a:r>
+              <a:rPr lang="en-US" dirty="0"/>
+              <a:t>Use Links!</a:t>
+            </a:r>
           </a:p>
         </p:txBody>
       </p:sp>
@@ -14140,6 +15185,265 @@
     <p:extLst>
       <p:ext uri="{BB962C8B-B14F-4D97-AF65-F5344CB8AC3E}">
         <p14:creationId xmlns:p14="http://schemas.microsoft.com/office/powerpoint/2010/main" val="1066608502"/>
+      </p:ext>
+    </p:extLst>
+  </p:cSld>
+  <p:clrMapOvr>
+    <a:masterClrMapping/>
+  </p:clrMapOvr>
+</p:sld>
+</file>
+
+<file path=ppt/slides/slide8.xml><?xml version="1.0" encoding="utf-8"?>
+<p:sld xmlns:a="http://schemas.openxmlformats.org/drawingml/2006/main" xmlns:r="http://schemas.openxmlformats.org/officeDocument/2006/relationships" xmlns:p="http://schemas.openxmlformats.org/presentationml/2006/main">
+  <p:cSld>
+    <p:spTree>
+      <p:nvGrpSpPr>
+        <p:cNvPr id="1" name=""/>
+        <p:cNvGrpSpPr/>
+        <p:nvPr/>
+      </p:nvGrpSpPr>
+      <p:grpSpPr>
+        <a:xfrm>
+          <a:off x="0" y="0"/>
+          <a:ext cx="0" cy="0"/>
+          <a:chOff x="0" y="0"/>
+          <a:chExt cx="0" cy="0"/>
+        </a:xfrm>
+      </p:grpSpPr>
+      <p:sp>
+        <p:nvSpPr>
+          <p:cNvPr id="2" name="Title 1">
+            <a:extLst>
+              <a:ext uri="{FF2B5EF4-FFF2-40B4-BE49-F238E27FC236}">
+                <a16:creationId xmlns:a16="http://schemas.microsoft.com/office/drawing/2014/main" id="{B950C541-72CB-3843-A8DB-FD1CEA4E289E}"/>
+              </a:ext>
+            </a:extLst>
+          </p:cNvPr>
+          <p:cNvSpPr>
+            <a:spLocks noGrp="1"/>
+          </p:cNvSpPr>
+          <p:nvPr>
+            <p:ph type="title"/>
+          </p:nvPr>
+        </p:nvSpPr>
+        <p:spPr/>
+        <p:txBody>
+          <a:bodyPr/>
+          <a:lstStyle/>
+          <a:p>
+            <a:r>
+              <a:rPr lang="en-US" dirty="0"/>
+              <a:t>Navigation - Links</a:t>
+            </a:r>
+          </a:p>
+        </p:txBody>
+      </p:sp>
+      <p:sp>
+        <p:nvSpPr>
+          <p:cNvPr id="3" name="Content Placeholder 2">
+            <a:extLst>
+              <a:ext uri="{FF2B5EF4-FFF2-40B4-BE49-F238E27FC236}">
+                <a16:creationId xmlns:a16="http://schemas.microsoft.com/office/drawing/2014/main" id="{BD36BE10-FB37-464A-A374-0581B5E9ACF8}"/>
+              </a:ext>
+            </a:extLst>
+          </p:cNvPr>
+          <p:cNvSpPr>
+            <a:spLocks noGrp="1"/>
+          </p:cNvSpPr>
+          <p:nvPr>
+            <p:ph idx="1"/>
+          </p:nvPr>
+        </p:nvSpPr>
+        <p:spPr/>
+        <p:txBody>
+          <a:bodyPr/>
+          <a:lstStyle/>
+          <a:p>
+            <a:r>
+              <a:rPr lang="en-US" dirty="0"/>
+              <a:t>User clicks on a &lt;Link&gt;</a:t>
+            </a:r>
+          </a:p>
+          <a:p>
+            <a:r>
+              <a:rPr lang="en-US" dirty="0"/>
+              <a:t>React Router prevents the browser from navigating to the new page and fetching new </a:t>
+            </a:r>
+            <a:r>
+              <a:rPr lang="en-US" dirty="0" err="1"/>
+              <a:t>Index.html</a:t>
+            </a:r>
+            <a:r>
+              <a:rPr lang="en-US" dirty="0"/>
+              <a:t> file</a:t>
+            </a:r>
+          </a:p>
+          <a:p>
+            <a:r>
+              <a:rPr lang="en-US" dirty="0"/>
+              <a:t>URL still changes</a:t>
+            </a:r>
+          </a:p>
+          <a:p>
+            <a:r>
+              <a:rPr lang="en-US" dirty="0"/>
+              <a:t>Browser Router takes care of this.</a:t>
+            </a:r>
+          </a:p>
+          <a:p>
+            <a:r>
+              <a:rPr lang="en-US" dirty="0"/>
+              <a:t>This is why React apps are Single </a:t>
+            </a:r>
+            <a:r>
+              <a:rPr lang="en-US"/>
+              <a:t>Page Applications.</a:t>
+            </a:r>
+            <a:endParaRPr lang="en-US" dirty="0"/>
+          </a:p>
+        </p:txBody>
+      </p:sp>
+    </p:spTree>
+    <p:extLst>
+      <p:ext uri="{BB962C8B-B14F-4D97-AF65-F5344CB8AC3E}">
+        <p14:creationId xmlns:p14="http://schemas.microsoft.com/office/powerpoint/2010/main" val="1241365439"/>
+      </p:ext>
+    </p:extLst>
+  </p:cSld>
+  <p:clrMapOvr>
+    <a:masterClrMapping/>
+  </p:clrMapOvr>
+</p:sld>
+</file>
+
+<file path=ppt/slides/slide9.xml><?xml version="1.0" encoding="utf-8"?>
+<p:sld xmlns:a="http://schemas.openxmlformats.org/drawingml/2006/main" xmlns:r="http://schemas.openxmlformats.org/officeDocument/2006/relationships" xmlns:p="http://schemas.openxmlformats.org/presentationml/2006/main">
+  <p:cSld>
+    <p:spTree>
+      <p:nvGrpSpPr>
+        <p:cNvPr id="1" name=""/>
+        <p:cNvGrpSpPr/>
+        <p:nvPr/>
+      </p:nvGrpSpPr>
+      <p:grpSpPr>
+        <a:xfrm>
+          <a:off x="0" y="0"/>
+          <a:ext cx="0" cy="0"/>
+          <a:chOff x="0" y="0"/>
+          <a:chExt cx="0" cy="0"/>
+        </a:xfrm>
+      </p:grpSpPr>
+      <p:sp>
+        <p:nvSpPr>
+          <p:cNvPr id="2" name="Title 1">
+            <a:extLst>
+              <a:ext uri="{FF2B5EF4-FFF2-40B4-BE49-F238E27FC236}">
+                <a16:creationId xmlns:a16="http://schemas.microsoft.com/office/drawing/2014/main" id="{E7710FAD-4757-4B4A-8310-FDE32E664457}"/>
+              </a:ext>
+            </a:extLst>
+          </p:cNvPr>
+          <p:cNvSpPr>
+            <a:spLocks noGrp="1"/>
+          </p:cNvSpPr>
+          <p:nvPr>
+            <p:ph type="title"/>
+          </p:nvPr>
+        </p:nvSpPr>
+        <p:spPr/>
+        <p:txBody>
+          <a:bodyPr>
+            <a:normAutofit fontScale="90000"/>
+          </a:bodyPr>
+          <a:lstStyle/>
+          <a:p>
+            <a:r>
+              <a:rPr lang="en-US" dirty="0"/>
+              <a:t>User Authentication using google O-Auth</a:t>
+            </a:r>
+            <a:br>
+              <a:rPr lang="en-US" dirty="0"/>
+            </a:br>
+            <a:r>
+              <a:rPr lang="en-US" dirty="0"/>
+              <a:t>USER’S BROWSER</a:t>
+            </a:r>
+          </a:p>
+        </p:txBody>
+      </p:sp>
+      <p:sp>
+        <p:nvSpPr>
+          <p:cNvPr id="3" name="Content Placeholder 2">
+            <a:extLst>
+              <a:ext uri="{FF2B5EF4-FFF2-40B4-BE49-F238E27FC236}">
+                <a16:creationId xmlns:a16="http://schemas.microsoft.com/office/drawing/2014/main" id="{DBF75ED2-4D67-F840-BC23-C4E617361E08}"/>
+              </a:ext>
+            </a:extLst>
+          </p:cNvPr>
+          <p:cNvSpPr>
+            <a:spLocks noGrp="1"/>
+          </p:cNvSpPr>
+          <p:nvPr>
+            <p:ph idx="1"/>
+          </p:nvPr>
+        </p:nvSpPr>
+        <p:spPr/>
+        <p:txBody>
+          <a:bodyPr/>
+          <a:lstStyle/>
+          <a:p>
+            <a:r>
+              <a:rPr lang="en-US" dirty="0"/>
+              <a:t>User clicks on ‘Login with Google’</a:t>
+            </a:r>
+          </a:p>
+          <a:p>
+            <a:r>
+              <a:rPr lang="en-US" dirty="0"/>
+              <a:t>I use Google’s JS library (</a:t>
+            </a:r>
+            <a:r>
+              <a:rPr lang="en-US" dirty="0" err="1"/>
+              <a:t>gapi</a:t>
+            </a:r>
+            <a:r>
+              <a:rPr lang="en-US" dirty="0"/>
+              <a:t>) to initiate the O-Auth process</a:t>
+            </a:r>
+          </a:p>
+          <a:p>
+            <a:pPr marL="0" indent="0">
+              <a:buNone/>
+            </a:pPr>
+            <a:r>
+              <a:rPr lang="en-US" dirty="0"/>
+              <a:t>Jump to Point 1 in the GOOGLE SERVERS</a:t>
+            </a:r>
+          </a:p>
+          <a:p>
+            <a:r>
+              <a:rPr lang="en-US" dirty="0"/>
+              <a:t>Google’s JS library invokes a callback in the React App</a:t>
+            </a:r>
+          </a:p>
+          <a:p>
+            <a:r>
+              <a:rPr lang="en-US" dirty="0"/>
+              <a:t>Callback is provided with an authorization token and user information</a:t>
+            </a:r>
+          </a:p>
+          <a:p>
+            <a:pPr marL="0" indent="0">
+              <a:buNone/>
+            </a:pPr>
+            <a:endParaRPr lang="en-US" dirty="0"/>
+          </a:p>
+        </p:txBody>
+      </p:sp>
+    </p:spTree>
+    <p:extLst>
+      <p:ext uri="{BB962C8B-B14F-4D97-AF65-F5344CB8AC3E}">
+        <p14:creationId xmlns:p14="http://schemas.microsoft.com/office/powerpoint/2010/main" val="2057843416"/>
       </p:ext>
     </p:extLst>
   </p:cSld>

</xml_diff>

<commit_message>
(create, edit) -> form, browserRouter -> router (history), others
</commit_message>
<xml_diff>
--- a/ProjectPresentation.pptx
+++ b/ProjectPresentation.pptx
@@ -21,6 +21,7 @@
     <p:sldId id="264" r:id="rId15"/>
     <p:sldId id="265" r:id="rId16"/>
     <p:sldId id="266" r:id="rId17"/>
+    <p:sldId id="272" r:id="rId18"/>
   </p:sldIdLst>
   <p:sldSz cx="12192000" cy="6858000"/>
   <p:notesSz cx="6858000" cy="9144000"/>
@@ -14545,7 +14546,7 @@
           <a:p>
             <a:r>
               <a:rPr lang="en-US" dirty="0"/>
-              <a:t>Using JSON server for these RESTful API</a:t>
+              <a:t>Using JSON server for implementing RESTful API</a:t>
             </a:r>
           </a:p>
         </p:txBody>
@@ -14583,6 +14584,101 @@
     <p:extLst>
       <p:ext uri="{BB962C8B-B14F-4D97-AF65-F5344CB8AC3E}">
         <p14:creationId xmlns:p14="http://schemas.microsoft.com/office/powerpoint/2010/main" val="158763133"/>
+      </p:ext>
+    </p:extLst>
+  </p:cSld>
+  <p:clrMapOvr>
+    <a:masterClrMapping/>
+  </p:clrMapOvr>
+</p:sld>
+</file>
+
+<file path=ppt/slides/slide17.xml><?xml version="1.0" encoding="utf-8"?>
+<p:sld xmlns:a="http://schemas.openxmlformats.org/drawingml/2006/main" xmlns:r="http://schemas.openxmlformats.org/officeDocument/2006/relationships" xmlns:p="http://schemas.openxmlformats.org/presentationml/2006/main">
+  <p:cSld>
+    <p:spTree>
+      <p:nvGrpSpPr>
+        <p:cNvPr id="1" name=""/>
+        <p:cNvGrpSpPr/>
+        <p:nvPr/>
+      </p:nvGrpSpPr>
+      <p:grpSpPr>
+        <a:xfrm>
+          <a:off x="0" y="0"/>
+          <a:ext cx="0" cy="0"/>
+          <a:chOff x="0" y="0"/>
+          <a:chExt cx="0" cy="0"/>
+        </a:xfrm>
+      </p:grpSpPr>
+      <p:sp>
+        <p:nvSpPr>
+          <p:cNvPr id="2" name="Title 1">
+            <a:extLst>
+              <a:ext uri="{FF2B5EF4-FFF2-40B4-BE49-F238E27FC236}">
+                <a16:creationId xmlns:a16="http://schemas.microsoft.com/office/drawing/2014/main" id="{4B90E1B2-1847-DA46-9CDC-99F2636155DB}"/>
+              </a:ext>
+            </a:extLst>
+          </p:cNvPr>
+          <p:cNvSpPr>
+            <a:spLocks noGrp="1"/>
+          </p:cNvSpPr>
+          <p:nvPr>
+            <p:ph type="title"/>
+          </p:nvPr>
+        </p:nvSpPr>
+        <p:spPr/>
+        <p:txBody>
+          <a:bodyPr/>
+          <a:lstStyle/>
+          <a:p>
+            <a:r>
+              <a:rPr lang="en-US" dirty="0"/>
+              <a:t>Response from the </a:t>
+            </a:r>
+            <a:r>
+              <a:rPr lang="en-US" dirty="0" err="1"/>
+              <a:t>api</a:t>
+            </a:r>
+            <a:r>
+              <a:rPr lang="en-US" dirty="0"/>
+              <a:t> server</a:t>
+            </a:r>
+          </a:p>
+        </p:txBody>
+      </p:sp>
+      <p:pic>
+        <p:nvPicPr>
+          <p:cNvPr id="5" name="Content Placeholder 4" descr="Diagram&#10;&#10;Description automatically generated">
+            <a:extLst>
+              <a:ext uri="{FF2B5EF4-FFF2-40B4-BE49-F238E27FC236}">
+                <a16:creationId xmlns:a16="http://schemas.microsoft.com/office/drawing/2014/main" id="{801DD560-4EAE-0346-9BD0-72413341778A}"/>
+              </a:ext>
+            </a:extLst>
+          </p:cNvPr>
+          <p:cNvPicPr>
+            <a:picLocks noGrp="1" noChangeAspect="1"/>
+          </p:cNvPicPr>
+          <p:nvPr>
+            <p:ph idx="1"/>
+          </p:nvPr>
+        </p:nvPicPr>
+        <p:blipFill>
+          <a:blip r:embed="rId2"/>
+          <a:stretch>
+            <a:fillRect/>
+          </a:stretch>
+        </p:blipFill>
+        <p:spPr>
+          <a:xfrm>
+            <a:off x="2601618" y="1825625"/>
+            <a:ext cx="6988764" cy="4351338"/>
+          </a:xfrm>
+        </p:spPr>
+      </p:pic>
+    </p:spTree>
+    <p:extLst>
+      <p:ext uri="{BB962C8B-B14F-4D97-AF65-F5344CB8AC3E}">
+        <p14:creationId xmlns:p14="http://schemas.microsoft.com/office/powerpoint/2010/main" val="4108637828"/>
       </p:ext>
     </p:extLst>
   </p:cSld>

</xml_diff>